<commit_message>
Change code to use unordered/ordered list, robustifications
Signed-off-by: Christoph Auer <cau@zurich.ibm.com>
</commit_message>
<xml_diff>
--- a/tests/data/powerpoint_sample.pptx
+++ b/tests/data/powerpoint_sample.pptx
@@ -6,6 +6,7 @@
   </p:sldMasterIdLst>
   <p:sldIdLst>
     <p:sldId id="256" r:id="rId2"/>
+    <p:sldId id="257" r:id="rId3"/>
   </p:sldIdLst>
   <p:sldSz cx="12192000" cy="6858000"/>
   <p:notesSz cx="6858000" cy="9144000"/>
@@ -104,6 +105,11 @@
       </a:defRPr>
     </a:lvl9pPr>
   </p:defaultTextStyle>
+  <p:extLst>
+    <p:ext uri="{EFAFB233-063F-42B5-8137-9DF3F51BA10A}">
+      <p15:sldGuideLst xmlns:p15="http://schemas.microsoft.com/office/powerpoint/2012/main"/>
+    </p:ext>
+  </p:extLst>
 </p:presentation>
 </file>
 
@@ -256,7 +262,7 @@
           <a:p>
             <a:fld id="{376CE277-F64F-CD4D-8092-A1FBD0226130}" type="datetimeFigureOut">
               <a:rPr lang="en-CH" smtClean="0"/>
-              <a:t>26.09.2024</a:t>
+              <a:t>10/11/24</a:t>
             </a:fld>
             <a:endParaRPr lang="en-CH"/>
           </a:p>
@@ -456,7 +462,7 @@
           <a:p>
             <a:fld id="{376CE277-F64F-CD4D-8092-A1FBD0226130}" type="datetimeFigureOut">
               <a:rPr lang="en-CH" smtClean="0"/>
-              <a:t>26.09.2024</a:t>
+              <a:t>10/11/24</a:t>
             </a:fld>
             <a:endParaRPr lang="en-CH"/>
           </a:p>
@@ -666,7 +672,7 @@
           <a:p>
             <a:fld id="{376CE277-F64F-CD4D-8092-A1FBD0226130}" type="datetimeFigureOut">
               <a:rPr lang="en-CH" smtClean="0"/>
-              <a:t>26.09.2024</a:t>
+              <a:t>10/11/24</a:t>
             </a:fld>
             <a:endParaRPr lang="en-CH"/>
           </a:p>
@@ -866,7 +872,7 @@
           <a:p>
             <a:fld id="{376CE277-F64F-CD4D-8092-A1FBD0226130}" type="datetimeFigureOut">
               <a:rPr lang="en-CH" smtClean="0"/>
-              <a:t>26.09.2024</a:t>
+              <a:t>10/11/24</a:t>
             </a:fld>
             <a:endParaRPr lang="en-CH"/>
           </a:p>
@@ -1142,7 +1148,7 @@
           <a:p>
             <a:fld id="{376CE277-F64F-CD4D-8092-A1FBD0226130}" type="datetimeFigureOut">
               <a:rPr lang="en-CH" smtClean="0"/>
-              <a:t>26.09.2024</a:t>
+              <a:t>10/11/24</a:t>
             </a:fld>
             <a:endParaRPr lang="en-CH"/>
           </a:p>
@@ -1410,7 +1416,7 @@
           <a:p>
             <a:fld id="{376CE277-F64F-CD4D-8092-A1FBD0226130}" type="datetimeFigureOut">
               <a:rPr lang="en-CH" smtClean="0"/>
-              <a:t>26.09.2024</a:t>
+              <a:t>10/11/24</a:t>
             </a:fld>
             <a:endParaRPr lang="en-CH"/>
           </a:p>
@@ -1825,7 +1831,7 @@
           <a:p>
             <a:fld id="{376CE277-F64F-CD4D-8092-A1FBD0226130}" type="datetimeFigureOut">
               <a:rPr lang="en-CH" smtClean="0"/>
-              <a:t>26.09.2024</a:t>
+              <a:t>10/11/24</a:t>
             </a:fld>
             <a:endParaRPr lang="en-CH"/>
           </a:p>
@@ -1967,7 +1973,7 @@
           <a:p>
             <a:fld id="{376CE277-F64F-CD4D-8092-A1FBD0226130}" type="datetimeFigureOut">
               <a:rPr lang="en-CH" smtClean="0"/>
-              <a:t>26.09.2024</a:t>
+              <a:t>10/11/24</a:t>
             </a:fld>
             <a:endParaRPr lang="en-CH"/>
           </a:p>
@@ -2080,7 +2086,7 @@
           <a:p>
             <a:fld id="{376CE277-F64F-CD4D-8092-A1FBD0226130}" type="datetimeFigureOut">
               <a:rPr lang="en-CH" smtClean="0"/>
-              <a:t>26.09.2024</a:t>
+              <a:t>10/11/24</a:t>
             </a:fld>
             <a:endParaRPr lang="en-CH"/>
           </a:p>
@@ -2393,7 +2399,7 @@
           <a:p>
             <a:fld id="{376CE277-F64F-CD4D-8092-A1FBD0226130}" type="datetimeFigureOut">
               <a:rPr lang="en-CH" smtClean="0"/>
-              <a:t>26.09.2024</a:t>
+              <a:t>10/11/24</a:t>
             </a:fld>
             <a:endParaRPr lang="en-CH"/>
           </a:p>
@@ -2682,7 +2688,7 @@
           <a:p>
             <a:fld id="{376CE277-F64F-CD4D-8092-A1FBD0226130}" type="datetimeFigureOut">
               <a:rPr lang="en-CH" smtClean="0"/>
-              <a:t>26.09.2024</a:t>
+              <a:t>10/11/24</a:t>
             </a:fld>
             <a:endParaRPr lang="en-CH"/>
           </a:p>
@@ -2925,7 +2931,7 @@
           <a:p>
             <a:fld id="{376CE277-F64F-CD4D-8092-A1FBD0226130}" type="datetimeFigureOut">
               <a:rPr lang="en-CH" smtClean="0"/>
-              <a:t>26.09.2024</a:t>
+              <a:t>10/11/24</a:t>
             </a:fld>
             <a:endParaRPr lang="en-CH"/>
           </a:p>
@@ -4293,6 +4299,184 @@
     <p:extLst>
       <p:ext uri="{BB962C8B-B14F-4D97-AF65-F5344CB8AC3E}">
         <p14:creationId xmlns:p14="http://schemas.microsoft.com/office/powerpoint/2010/main" val="748081851"/>
+      </p:ext>
+    </p:extLst>
+  </p:cSld>
+  <p:clrMapOvr>
+    <a:masterClrMapping/>
+  </p:clrMapOvr>
+</p:sld>
+</file>
+
+<file path=ppt/slides/slide2.xml><?xml version="1.0" encoding="utf-8"?>
+<p:sld xmlns:a="http://schemas.openxmlformats.org/drawingml/2006/main" xmlns:r="http://schemas.openxmlformats.org/officeDocument/2006/relationships" xmlns:p="http://schemas.openxmlformats.org/presentationml/2006/main">
+  <p:cSld>
+    <p:spTree>
+      <p:nvGrpSpPr>
+        <p:cNvPr id="1" name=""/>
+        <p:cNvGrpSpPr/>
+        <p:nvPr/>
+      </p:nvGrpSpPr>
+      <p:grpSpPr>
+        <a:xfrm>
+          <a:off x="0" y="0"/>
+          <a:ext cx="0" cy="0"/>
+          <a:chOff x="0" y="0"/>
+          <a:chExt cx="0" cy="0"/>
+        </a:xfrm>
+      </p:grpSpPr>
+      <p:sp>
+        <p:nvSpPr>
+          <p:cNvPr id="2" name="Title 1">
+            <a:extLst>
+              <a:ext uri="{FF2B5EF4-FFF2-40B4-BE49-F238E27FC236}">
+                <a16:creationId xmlns:a16="http://schemas.microsoft.com/office/drawing/2014/main" id="{172A6AA4-FDAA-E2CD-679D-B548146A416A}"/>
+              </a:ext>
+            </a:extLst>
+          </p:cNvPr>
+          <p:cNvSpPr>
+            <a:spLocks noGrp="1"/>
+          </p:cNvSpPr>
+          <p:nvPr>
+            <p:ph type="title"/>
+          </p:nvPr>
+        </p:nvSpPr>
+        <p:spPr/>
+        <p:txBody>
+          <a:bodyPr/>
+          <a:lstStyle/>
+          <a:p>
+            <a:r>
+              <a:rPr lang="en-US" dirty="0"/>
+              <a:t>Second slide title</a:t>
+            </a:r>
+          </a:p>
+        </p:txBody>
+      </p:sp>
+      <p:sp>
+        <p:nvSpPr>
+          <p:cNvPr id="3" name="Content Placeholder 2">
+            <a:extLst>
+              <a:ext uri="{FF2B5EF4-FFF2-40B4-BE49-F238E27FC236}">
+                <a16:creationId xmlns:a16="http://schemas.microsoft.com/office/drawing/2014/main" id="{A47A81CE-C247-03A8-FAEA-FCC3BE5735F2}"/>
+              </a:ext>
+            </a:extLst>
+          </p:cNvPr>
+          <p:cNvSpPr>
+            <a:spLocks noGrp="1"/>
+          </p:cNvSpPr>
+          <p:nvPr>
+            <p:ph idx="1"/>
+          </p:nvPr>
+        </p:nvSpPr>
+        <p:spPr>
+          <a:xfrm>
+            <a:off x="838200" y="1825625"/>
+            <a:ext cx="3623631" cy="4351338"/>
+          </a:xfrm>
+        </p:spPr>
+        <p:txBody>
+          <a:bodyPr/>
+          <a:lstStyle/>
+          <a:p>
+            <a:pPr marL="0" indent="0">
+              <a:buNone/>
+            </a:pPr>
+            <a:r>
+              <a:rPr lang="en-US" dirty="0"/>
+              <a:t>Let’s introduce a list</a:t>
+            </a:r>
+          </a:p>
+          <a:p>
+            <a:r>
+              <a:rPr lang="en-US" dirty="0"/>
+              <a:t>With foo</a:t>
+            </a:r>
+          </a:p>
+          <a:p>
+            <a:r>
+              <a:rPr lang="en-US" dirty="0"/>
+              <a:t>Bar</a:t>
+            </a:r>
+          </a:p>
+          <a:p>
+            <a:r>
+              <a:rPr lang="en-US" dirty="0"/>
+              <a:t>And </a:t>
+            </a:r>
+            <a:r>
+              <a:rPr lang="en-US" dirty="0" err="1"/>
+              <a:t>baz</a:t>
+            </a:r>
+            <a:r>
+              <a:rPr lang="en-US" dirty="0"/>
+              <a:t> things</a:t>
+            </a:r>
+          </a:p>
+          <a:p>
+            <a:pPr marL="0" indent="0">
+              <a:buNone/>
+            </a:pPr>
+            <a:endParaRPr lang="en-US" dirty="0"/>
+          </a:p>
+          <a:p>
+            <a:endParaRPr lang="en-US" dirty="0"/>
+          </a:p>
+        </p:txBody>
+      </p:sp>
+      <p:sp>
+        <p:nvSpPr>
+          <p:cNvPr id="4" name="Rectangle 3">
+            <a:extLst>
+              <a:ext uri="{FF2B5EF4-FFF2-40B4-BE49-F238E27FC236}">
+                <a16:creationId xmlns:a16="http://schemas.microsoft.com/office/drawing/2014/main" id="{5F90ABF3-1D93-D35B-9CD4-07A12B50DF41}"/>
+              </a:ext>
+            </a:extLst>
+          </p:cNvPr>
+          <p:cNvSpPr/>
+          <p:nvPr/>
+        </p:nvSpPr>
+        <p:spPr>
+          <a:xfrm>
+            <a:off x="6180463" y="1344058"/>
+            <a:ext cx="4076241" cy="3877937"/>
+          </a:xfrm>
+          <a:prstGeom prst="rect">
+            <a:avLst/>
+          </a:prstGeom>
+        </p:spPr>
+        <p:style>
+          <a:lnRef idx="2">
+            <a:schemeClr val="accent1">
+              <a:shade val="15000"/>
+            </a:schemeClr>
+          </a:lnRef>
+          <a:fillRef idx="1">
+            <a:schemeClr val="accent1"/>
+          </a:fillRef>
+          <a:effectRef idx="0">
+            <a:schemeClr val="accent1"/>
+          </a:effectRef>
+          <a:fontRef idx="minor">
+            <a:schemeClr val="lt1"/>
+          </a:fontRef>
+        </p:style>
+        <p:txBody>
+          <a:bodyPr rtlCol="0" anchor="ctr"/>
+          <a:lstStyle/>
+          <a:p>
+            <a:pPr algn="ctr"/>
+            <a:r>
+              <a:rPr lang="en-US" dirty="0"/>
+              <a:t>A rectangle shape with this text inside.</a:t>
+            </a:r>
+          </a:p>
+        </p:txBody>
+      </p:sp>
+    </p:spTree>
+    <p:extLst>
+      <p:ext uri="{BB962C8B-B14F-4D97-AF65-F5344CB8AC3E}">
+        <p14:creationId xmlns:p14="http://schemas.microsoft.com/office/powerpoint/2010/main" val="2367400921"/>
       </p:ext>
     </p:extLst>
   </p:cSld>

</xml_diff>

<commit_message>
Updated pptx backend, fixes issues with lists, also added more different list cases to example
Signed-off-by: Maxim Lysak <mly@zurich.ibm.com>
</commit_message>
<xml_diff>
--- a/tests/data/powerpoint_sample.pptx
+++ b/tests/data/powerpoint_sample.pptx
@@ -7,6 +7,7 @@
   <p:sldIdLst>
     <p:sldId id="256" r:id="rId2"/>
     <p:sldId id="257" r:id="rId3"/>
+    <p:sldId id="258" r:id="rId4"/>
   </p:sldIdLst>
   <p:sldSz cx="12192000" cy="6858000"/>
   <p:notesSz cx="6858000" cy="9144000"/>
@@ -262,7 +263,7 @@
           <a:p>
             <a:fld id="{376CE277-F64F-CD4D-8092-A1FBD0226130}" type="datetimeFigureOut">
               <a:rPr lang="en-CH" smtClean="0"/>
-              <a:t>10/11/24</a:t>
+              <a:t>14.10.2024</a:t>
             </a:fld>
             <a:endParaRPr lang="en-CH"/>
           </a:p>
@@ -462,7 +463,7 @@
           <a:p>
             <a:fld id="{376CE277-F64F-CD4D-8092-A1FBD0226130}" type="datetimeFigureOut">
               <a:rPr lang="en-CH" smtClean="0"/>
-              <a:t>10/11/24</a:t>
+              <a:t>14.10.2024</a:t>
             </a:fld>
             <a:endParaRPr lang="en-CH"/>
           </a:p>
@@ -672,7 +673,7 @@
           <a:p>
             <a:fld id="{376CE277-F64F-CD4D-8092-A1FBD0226130}" type="datetimeFigureOut">
               <a:rPr lang="en-CH" smtClean="0"/>
-              <a:t>10/11/24</a:t>
+              <a:t>14.10.2024</a:t>
             </a:fld>
             <a:endParaRPr lang="en-CH"/>
           </a:p>
@@ -872,7 +873,7 @@
           <a:p>
             <a:fld id="{376CE277-F64F-CD4D-8092-A1FBD0226130}" type="datetimeFigureOut">
               <a:rPr lang="en-CH" smtClean="0"/>
-              <a:t>10/11/24</a:t>
+              <a:t>14.10.2024</a:t>
             </a:fld>
             <a:endParaRPr lang="en-CH"/>
           </a:p>
@@ -1148,7 +1149,7 @@
           <a:p>
             <a:fld id="{376CE277-F64F-CD4D-8092-A1FBD0226130}" type="datetimeFigureOut">
               <a:rPr lang="en-CH" smtClean="0"/>
-              <a:t>10/11/24</a:t>
+              <a:t>14.10.2024</a:t>
             </a:fld>
             <a:endParaRPr lang="en-CH"/>
           </a:p>
@@ -1416,7 +1417,7 @@
           <a:p>
             <a:fld id="{376CE277-F64F-CD4D-8092-A1FBD0226130}" type="datetimeFigureOut">
               <a:rPr lang="en-CH" smtClean="0"/>
-              <a:t>10/11/24</a:t>
+              <a:t>14.10.2024</a:t>
             </a:fld>
             <a:endParaRPr lang="en-CH"/>
           </a:p>
@@ -1831,7 +1832,7 @@
           <a:p>
             <a:fld id="{376CE277-F64F-CD4D-8092-A1FBD0226130}" type="datetimeFigureOut">
               <a:rPr lang="en-CH" smtClean="0"/>
-              <a:t>10/11/24</a:t>
+              <a:t>14.10.2024</a:t>
             </a:fld>
             <a:endParaRPr lang="en-CH"/>
           </a:p>
@@ -1973,7 +1974,7 @@
           <a:p>
             <a:fld id="{376CE277-F64F-CD4D-8092-A1FBD0226130}" type="datetimeFigureOut">
               <a:rPr lang="en-CH" smtClean="0"/>
-              <a:t>10/11/24</a:t>
+              <a:t>14.10.2024</a:t>
             </a:fld>
             <a:endParaRPr lang="en-CH"/>
           </a:p>
@@ -2086,7 +2087,7 @@
           <a:p>
             <a:fld id="{376CE277-F64F-CD4D-8092-A1FBD0226130}" type="datetimeFigureOut">
               <a:rPr lang="en-CH" smtClean="0"/>
-              <a:t>10/11/24</a:t>
+              <a:t>14.10.2024</a:t>
             </a:fld>
             <a:endParaRPr lang="en-CH"/>
           </a:p>
@@ -2399,7 +2400,7 @@
           <a:p>
             <a:fld id="{376CE277-F64F-CD4D-8092-A1FBD0226130}" type="datetimeFigureOut">
               <a:rPr lang="en-CH" smtClean="0"/>
-              <a:t>10/11/24</a:t>
+              <a:t>14.10.2024</a:t>
             </a:fld>
             <a:endParaRPr lang="en-CH"/>
           </a:p>
@@ -2688,7 +2689,7 @@
           <a:p>
             <a:fld id="{376CE277-F64F-CD4D-8092-A1FBD0226130}" type="datetimeFigureOut">
               <a:rPr lang="en-CH" smtClean="0"/>
-              <a:t>10/11/24</a:t>
+              <a:t>14.10.2024</a:t>
             </a:fld>
             <a:endParaRPr lang="en-CH"/>
           </a:p>
@@ -2931,7 +2932,7 @@
           <a:p>
             <a:fld id="{376CE277-F64F-CD4D-8092-A1FBD0226130}" type="datetimeFigureOut">
               <a:rPr lang="en-CH" smtClean="0"/>
-              <a:t>10/11/24</a:t>
+              <a:t>14.10.2024</a:t>
             </a:fld>
             <a:endParaRPr lang="en-CH"/>
           </a:p>
@@ -4372,7 +4373,7 @@
         <p:spPr>
           <a:xfrm>
             <a:off x="838200" y="1825625"/>
-            <a:ext cx="3623631" cy="4351338"/>
+            <a:ext cx="3623631" cy="2136775"/>
           </a:xfrm>
         </p:spPr>
         <p:txBody>
@@ -4412,12 +4413,6 @@
               <a:rPr lang="en-US" dirty="0"/>
               <a:t> things</a:t>
             </a:r>
-          </a:p>
-          <a:p>
-            <a:pPr marL="0" indent="0">
-              <a:buNone/>
-            </a:pPr>
-            <a:endParaRPr lang="en-US" dirty="0"/>
           </a:p>
           <a:p>
             <a:endParaRPr lang="en-US" dirty="0"/>
@@ -4477,6 +4472,360 @@
     <p:extLst>
       <p:ext uri="{BB962C8B-B14F-4D97-AF65-F5344CB8AC3E}">
         <p14:creationId xmlns:p14="http://schemas.microsoft.com/office/powerpoint/2010/main" val="2367400921"/>
+      </p:ext>
+    </p:extLst>
+  </p:cSld>
+  <p:clrMapOvr>
+    <a:masterClrMapping/>
+  </p:clrMapOvr>
+</p:sld>
+</file>
+
+<file path=ppt/slides/slide3.xml><?xml version="1.0" encoding="utf-8"?>
+<p:sld xmlns:a="http://schemas.openxmlformats.org/drawingml/2006/main" xmlns:r="http://schemas.openxmlformats.org/officeDocument/2006/relationships" xmlns:p="http://schemas.openxmlformats.org/presentationml/2006/main">
+  <p:cSld>
+    <p:spTree>
+      <p:nvGrpSpPr>
+        <p:cNvPr id="1" name=""/>
+        <p:cNvGrpSpPr/>
+        <p:nvPr/>
+      </p:nvGrpSpPr>
+      <p:grpSpPr>
+        <a:xfrm>
+          <a:off x="0" y="0"/>
+          <a:ext cx="0" cy="0"/>
+          <a:chOff x="0" y="0"/>
+          <a:chExt cx="0" cy="0"/>
+        </a:xfrm>
+      </p:grpSpPr>
+      <p:sp>
+        <p:nvSpPr>
+          <p:cNvPr id="4" name="TextBox 3">
+            <a:extLst>
+              <a:ext uri="{FF2B5EF4-FFF2-40B4-BE49-F238E27FC236}">
+                <a16:creationId xmlns:a16="http://schemas.microsoft.com/office/drawing/2014/main" id="{7381B1C6-C1F4-5AC6-6B79-00CE4EDEFBC6}"/>
+              </a:ext>
+            </a:extLst>
+          </p:cNvPr>
+          <p:cNvSpPr txBox="1"/>
+          <p:nvPr/>
+        </p:nvSpPr>
+        <p:spPr>
+          <a:xfrm>
+            <a:off x="2423634" y="2434665"/>
+            <a:ext cx="1504643" cy="923330"/>
+          </a:xfrm>
+          <a:prstGeom prst="rect">
+            <a:avLst/>
+          </a:prstGeom>
+          <a:noFill/>
+        </p:spPr>
+        <p:txBody>
+          <a:bodyPr wrap="none" rtlCol="0">
+            <a:spAutoFit/>
+          </a:bodyPr>
+          <a:lstStyle/>
+          <a:p>
+            <a:pPr marL="342900" indent="-342900">
+              <a:buFont typeface="+mj-lt"/>
+              <a:buAutoNum type="arabicPeriod"/>
+            </a:pPr>
+            <a:r>
+              <a:rPr lang="en-CH" dirty="0"/>
+              <a:t>List item4</a:t>
+            </a:r>
+          </a:p>
+          <a:p>
+            <a:pPr marL="342900" indent="-342900">
+              <a:buFont typeface="+mj-lt"/>
+              <a:buAutoNum type="arabicPeriod"/>
+            </a:pPr>
+            <a:r>
+              <a:rPr lang="en-CH" dirty="0"/>
+              <a:t>List item5</a:t>
+            </a:r>
+          </a:p>
+          <a:p>
+            <a:pPr marL="342900" indent="-342900">
+              <a:buFont typeface="+mj-lt"/>
+              <a:buAutoNum type="arabicPeriod"/>
+            </a:pPr>
+            <a:r>
+              <a:rPr lang="en-CH" dirty="0"/>
+              <a:t>List item6</a:t>
+            </a:r>
+          </a:p>
+        </p:txBody>
+      </p:sp>
+      <p:sp>
+        <p:nvSpPr>
+          <p:cNvPr id="5" name="TextBox 4">
+            <a:extLst>
+              <a:ext uri="{FF2B5EF4-FFF2-40B4-BE49-F238E27FC236}">
+                <a16:creationId xmlns:a16="http://schemas.microsoft.com/office/drawing/2014/main" id="{0DC25B02-12B2-DAE2-08A6-35F2058F6C2F}"/>
+              </a:ext>
+            </a:extLst>
+          </p:cNvPr>
+          <p:cNvSpPr txBox="1"/>
+          <p:nvPr/>
+        </p:nvSpPr>
+        <p:spPr>
+          <a:xfrm>
+            <a:off x="4453634" y="2457553"/>
+            <a:ext cx="655949" cy="1200329"/>
+          </a:xfrm>
+          <a:prstGeom prst="rect">
+            <a:avLst/>
+          </a:prstGeom>
+          <a:noFill/>
+        </p:spPr>
+        <p:txBody>
+          <a:bodyPr wrap="none" rtlCol="0">
+            <a:spAutoFit/>
+          </a:bodyPr>
+          <a:lstStyle/>
+          <a:p>
+            <a:pPr marL="285750" indent="-285750">
+              <a:buFont typeface="Arial" panose="020B0604020202020204" pitchFamily="34" charset="0"/>
+              <a:buChar char="•"/>
+            </a:pPr>
+            <a:r>
+              <a:rPr lang="en-GB" dirty="0"/>
+              <a:t>I</a:t>
+            </a:r>
+            <a:r>
+              <a:rPr lang="en-CH" dirty="0"/>
+              <a:t>1</a:t>
+            </a:r>
+          </a:p>
+          <a:p>
+            <a:pPr marL="285750" indent="-285750">
+              <a:buFont typeface="Arial" panose="020B0604020202020204" pitchFamily="34" charset="0"/>
+              <a:buChar char="•"/>
+            </a:pPr>
+            <a:r>
+              <a:rPr lang="en-CH" dirty="0"/>
+              <a:t>I2</a:t>
+            </a:r>
+          </a:p>
+          <a:p>
+            <a:pPr marL="285750" indent="-285750">
+              <a:buFont typeface="Arial" panose="020B0604020202020204" pitchFamily="34" charset="0"/>
+              <a:buChar char="•"/>
+            </a:pPr>
+            <a:r>
+              <a:rPr lang="en-CH" dirty="0"/>
+              <a:t>I3</a:t>
+            </a:r>
+          </a:p>
+          <a:p>
+            <a:pPr marL="285750" indent="-285750">
+              <a:buFont typeface="Arial" panose="020B0604020202020204" pitchFamily="34" charset="0"/>
+              <a:buChar char="•"/>
+            </a:pPr>
+            <a:r>
+              <a:rPr lang="en-CH" dirty="0"/>
+              <a:t>I4</a:t>
+            </a:r>
+          </a:p>
+        </p:txBody>
+      </p:sp>
+      <p:sp>
+        <p:nvSpPr>
+          <p:cNvPr id="6" name="TextBox 5">
+            <a:extLst>
+              <a:ext uri="{FF2B5EF4-FFF2-40B4-BE49-F238E27FC236}">
+                <a16:creationId xmlns:a16="http://schemas.microsoft.com/office/drawing/2014/main" id="{0D55D766-B80F-0851-1D87-68A6C8D6E184}"/>
+              </a:ext>
+            </a:extLst>
+          </p:cNvPr>
+          <p:cNvSpPr txBox="1"/>
+          <p:nvPr/>
+        </p:nvSpPr>
+        <p:spPr>
+          <a:xfrm>
+            <a:off x="5634940" y="2457554"/>
+            <a:ext cx="1246110" cy="923330"/>
+          </a:xfrm>
+          <a:prstGeom prst="rect">
+            <a:avLst/>
+          </a:prstGeom>
+          <a:noFill/>
+        </p:spPr>
+        <p:txBody>
+          <a:bodyPr wrap="none" rtlCol="0">
+            <a:spAutoFit/>
+          </a:bodyPr>
+          <a:lstStyle/>
+          <a:p>
+            <a:r>
+              <a:rPr lang="en-GB" dirty="0"/>
+              <a:t>S</a:t>
+            </a:r>
+            <a:r>
+              <a:rPr lang="en-CH"/>
+              <a:t>ome info:</a:t>
+            </a:r>
+            <a:endParaRPr lang="en-CH" dirty="0"/>
+          </a:p>
+          <a:p>
+            <a:pPr marL="285750" indent="-285750">
+              <a:buFont typeface="Arial" panose="020B0604020202020204" pitchFamily="34" charset="0"/>
+              <a:buChar char="•"/>
+            </a:pPr>
+            <a:r>
+              <a:rPr lang="en-GB" dirty="0"/>
+              <a:t>I</a:t>
+            </a:r>
+            <a:r>
+              <a:rPr lang="en-CH" dirty="0"/>
+              <a:t>tem A</a:t>
+            </a:r>
+          </a:p>
+          <a:p>
+            <a:pPr marL="285750" indent="-285750">
+              <a:buFont typeface="Arial" panose="020B0604020202020204" pitchFamily="34" charset="0"/>
+              <a:buChar char="•"/>
+            </a:pPr>
+            <a:r>
+              <a:rPr lang="en-CH" dirty="0"/>
+              <a:t>Item B</a:t>
+            </a:r>
+          </a:p>
+        </p:txBody>
+      </p:sp>
+      <p:sp>
+        <p:nvSpPr>
+          <p:cNvPr id="7" name="TextBox 6">
+            <a:extLst>
+              <a:ext uri="{FF2B5EF4-FFF2-40B4-BE49-F238E27FC236}">
+                <a16:creationId xmlns:a16="http://schemas.microsoft.com/office/drawing/2014/main" id="{C696EAC4-97A5-9367-FBEB-A8A320736154}"/>
+              </a:ext>
+            </a:extLst>
+          </p:cNvPr>
+          <p:cNvSpPr txBox="1"/>
+          <p:nvPr/>
+        </p:nvSpPr>
+        <p:spPr>
+          <a:xfrm>
+            <a:off x="7531336" y="2459421"/>
+            <a:ext cx="1478290" cy="1200329"/>
+          </a:xfrm>
+          <a:prstGeom prst="rect">
+            <a:avLst/>
+          </a:prstGeom>
+          <a:noFill/>
+        </p:spPr>
+        <p:txBody>
+          <a:bodyPr wrap="none" rtlCol="0">
+            <a:spAutoFit/>
+          </a:bodyPr>
+          <a:lstStyle/>
+          <a:p>
+            <a:r>
+              <a:rPr lang="en-GB" dirty="0"/>
+              <a:t>M</a:t>
+            </a:r>
+            <a:r>
+              <a:rPr lang="en-CH" dirty="0"/>
+              <a:t>aybe a list?</a:t>
+            </a:r>
+          </a:p>
+          <a:p>
+            <a:pPr marL="285750" indent="-285750">
+              <a:buFont typeface="Arial" panose="020B0604020202020204" pitchFamily="34" charset="0"/>
+              <a:buChar char="•"/>
+            </a:pPr>
+            <a:r>
+              <a:rPr lang="en-CH" dirty="0"/>
+              <a:t>List1</a:t>
+            </a:r>
+          </a:p>
+          <a:p>
+            <a:pPr marL="285750" indent="-285750">
+              <a:buFont typeface="Arial" panose="020B0604020202020204" pitchFamily="34" charset="0"/>
+              <a:buChar char="•"/>
+            </a:pPr>
+            <a:r>
+              <a:rPr lang="en-CH" dirty="0"/>
+              <a:t>List2</a:t>
+            </a:r>
+          </a:p>
+          <a:p>
+            <a:pPr marL="285750" indent="-285750">
+              <a:buFont typeface="Arial" panose="020B0604020202020204" pitchFamily="34" charset="0"/>
+              <a:buChar char="•"/>
+            </a:pPr>
+            <a:r>
+              <a:rPr lang="en-CH" dirty="0"/>
+              <a:t>List3</a:t>
+            </a:r>
+          </a:p>
+        </p:txBody>
+      </p:sp>
+      <p:sp>
+        <p:nvSpPr>
+          <p:cNvPr id="8" name="TextBox 7">
+            <a:extLst>
+              <a:ext uri="{FF2B5EF4-FFF2-40B4-BE49-F238E27FC236}">
+                <a16:creationId xmlns:a16="http://schemas.microsoft.com/office/drawing/2014/main" id="{C5E6CC22-2CC3-5548-61EB-D2E26A377E47}"/>
+              </a:ext>
+            </a:extLst>
+          </p:cNvPr>
+          <p:cNvSpPr txBox="1"/>
+          <p:nvPr/>
+        </p:nvSpPr>
+        <p:spPr>
+          <a:xfrm>
+            <a:off x="9404392" y="2434665"/>
+            <a:ext cx="655949" cy="923330"/>
+          </a:xfrm>
+          <a:prstGeom prst="rect">
+            <a:avLst/>
+          </a:prstGeom>
+          <a:noFill/>
+        </p:spPr>
+        <p:txBody>
+          <a:bodyPr wrap="square" rtlCol="0">
+            <a:spAutoFit/>
+          </a:bodyPr>
+          <a:lstStyle/>
+          <a:p>
+            <a:pPr marL="285750" indent="-285750">
+              <a:buFont typeface="Arial" panose="020B0604020202020204" pitchFamily="34" charset="0"/>
+              <a:buChar char="•"/>
+            </a:pPr>
+            <a:r>
+              <a:rPr lang="en-GB" dirty="0"/>
+              <a:t>l1 </a:t>
+            </a:r>
+          </a:p>
+          <a:p>
+            <a:pPr marL="285750" indent="-285750">
+              <a:buFont typeface="Arial" panose="020B0604020202020204" pitchFamily="34" charset="0"/>
+              <a:buChar char="•"/>
+            </a:pPr>
+            <a:r>
+              <a:rPr lang="en-GB" dirty="0"/>
+              <a:t>l2</a:t>
+            </a:r>
+          </a:p>
+          <a:p>
+            <a:pPr marL="285750" indent="-285750">
+              <a:buFont typeface="Arial" panose="020B0604020202020204" pitchFamily="34" charset="0"/>
+              <a:buChar char="•"/>
+            </a:pPr>
+            <a:r>
+              <a:rPr lang="en-CH" dirty="0"/>
+              <a:t>l3</a:t>
+            </a:r>
+          </a:p>
+        </p:txBody>
+      </p:sp>
+    </p:spTree>
+    <p:extLst>
+      <p:ext uri="{BB962C8B-B14F-4D97-AF65-F5344CB8AC3E}">
+        <p14:creationId xmlns:p14="http://schemas.microsoft.com/office/powerpoint/2010/main" val="3650019037"/>
       </p:ext>
     </p:extLst>
   </p:cSld>

</xml_diff>

<commit_message>
small corrections to pptx
</commit_message>
<xml_diff>
--- a/tests/data/powerpoint_sample.pptx
+++ b/tests/data/powerpoint_sample.pptx
@@ -4663,10 +4663,9 @@
               <a:t>S</a:t>
             </a:r>
             <a:r>
-              <a:rPr lang="en-CH"/>
+              <a:rPr lang="en-CH" dirty="0"/>
               <a:t>ome info:</a:t>
             </a:r>
-            <a:endParaRPr lang="en-CH" dirty="0"/>
           </a:p>
           <a:p>
             <a:pPr marL="285750" indent="-285750">
@@ -4732,9 +4731,9 @@
             </a:r>
           </a:p>
           <a:p>
-            <a:pPr marL="285750" indent="-285750">
-              <a:buFont typeface="Arial" panose="020B0604020202020204" pitchFamily="34" charset="0"/>
-              <a:buChar char="•"/>
+            <a:pPr marL="342900" indent="-342900">
+              <a:buFont typeface="+mj-lt"/>
+              <a:buAutoNum type="arabicPeriod"/>
             </a:pPr>
             <a:r>
               <a:rPr lang="en-CH" dirty="0"/>
@@ -4742,9 +4741,9 @@
             </a:r>
           </a:p>
           <a:p>
-            <a:pPr marL="285750" indent="-285750">
-              <a:buFont typeface="Arial" panose="020B0604020202020204" pitchFamily="34" charset="0"/>
-              <a:buChar char="•"/>
+            <a:pPr marL="342900" indent="-342900">
+              <a:buFont typeface="+mj-lt"/>
+              <a:buAutoNum type="arabicPeriod"/>
             </a:pPr>
             <a:r>
               <a:rPr lang="en-CH" dirty="0"/>
@@ -4752,9 +4751,9 @@
             </a:r>
           </a:p>
           <a:p>
-            <a:pPr marL="285750" indent="-285750">
-              <a:buFont typeface="Arial" panose="020B0604020202020204" pitchFamily="34" charset="0"/>
-              <a:buChar char="•"/>
+            <a:pPr marL="342900" indent="-342900">
+              <a:buFont typeface="+mj-lt"/>
+              <a:buAutoNum type="arabicPeriod"/>
             </a:pPr>
             <a:r>
               <a:rPr lang="en-CH" dirty="0"/>

</xml_diff>

<commit_message>
Fixed issues with duplicated paragraphs and incorrect lists in pptx
Signed-off-by: Maksym Lysak <mly@zurich.ibm.com>
</commit_message>
<xml_diff>
--- a/tests/data/powerpoint_sample.pptx
+++ b/tests/data/powerpoint_sample.pptx
@@ -263,7 +263,7 @@
           <a:p>
             <a:fld id="{376CE277-F64F-CD4D-8092-A1FBD0226130}" type="datetimeFigureOut">
               <a:rPr lang="en-CH" smtClean="0"/>
-              <a:t>14.10.2024</a:t>
+              <a:t>10/23/24</a:t>
             </a:fld>
             <a:endParaRPr lang="en-CH"/>
           </a:p>
@@ -463,7 +463,7 @@
           <a:p>
             <a:fld id="{376CE277-F64F-CD4D-8092-A1FBD0226130}" type="datetimeFigureOut">
               <a:rPr lang="en-CH" smtClean="0"/>
-              <a:t>14.10.2024</a:t>
+              <a:t>10/23/24</a:t>
             </a:fld>
             <a:endParaRPr lang="en-CH"/>
           </a:p>
@@ -673,7 +673,7 @@
           <a:p>
             <a:fld id="{376CE277-F64F-CD4D-8092-A1FBD0226130}" type="datetimeFigureOut">
               <a:rPr lang="en-CH" smtClean="0"/>
-              <a:t>14.10.2024</a:t>
+              <a:t>10/23/24</a:t>
             </a:fld>
             <a:endParaRPr lang="en-CH"/>
           </a:p>
@@ -873,7 +873,7 @@
           <a:p>
             <a:fld id="{376CE277-F64F-CD4D-8092-A1FBD0226130}" type="datetimeFigureOut">
               <a:rPr lang="en-CH" smtClean="0"/>
-              <a:t>14.10.2024</a:t>
+              <a:t>10/23/24</a:t>
             </a:fld>
             <a:endParaRPr lang="en-CH"/>
           </a:p>
@@ -1149,7 +1149,7 @@
           <a:p>
             <a:fld id="{376CE277-F64F-CD4D-8092-A1FBD0226130}" type="datetimeFigureOut">
               <a:rPr lang="en-CH" smtClean="0"/>
-              <a:t>14.10.2024</a:t>
+              <a:t>10/23/24</a:t>
             </a:fld>
             <a:endParaRPr lang="en-CH"/>
           </a:p>
@@ -1417,7 +1417,7 @@
           <a:p>
             <a:fld id="{376CE277-F64F-CD4D-8092-A1FBD0226130}" type="datetimeFigureOut">
               <a:rPr lang="en-CH" smtClean="0"/>
-              <a:t>14.10.2024</a:t>
+              <a:t>10/23/24</a:t>
             </a:fld>
             <a:endParaRPr lang="en-CH"/>
           </a:p>
@@ -1832,7 +1832,7 @@
           <a:p>
             <a:fld id="{376CE277-F64F-CD4D-8092-A1FBD0226130}" type="datetimeFigureOut">
               <a:rPr lang="en-CH" smtClean="0"/>
-              <a:t>14.10.2024</a:t>
+              <a:t>10/23/24</a:t>
             </a:fld>
             <a:endParaRPr lang="en-CH"/>
           </a:p>
@@ -1974,7 +1974,7 @@
           <a:p>
             <a:fld id="{376CE277-F64F-CD4D-8092-A1FBD0226130}" type="datetimeFigureOut">
               <a:rPr lang="en-CH" smtClean="0"/>
-              <a:t>14.10.2024</a:t>
+              <a:t>10/23/24</a:t>
             </a:fld>
             <a:endParaRPr lang="en-CH"/>
           </a:p>
@@ -2087,7 +2087,7 @@
           <a:p>
             <a:fld id="{376CE277-F64F-CD4D-8092-A1FBD0226130}" type="datetimeFigureOut">
               <a:rPr lang="en-CH" smtClean="0"/>
-              <a:t>14.10.2024</a:t>
+              <a:t>10/23/24</a:t>
             </a:fld>
             <a:endParaRPr lang="en-CH"/>
           </a:p>
@@ -2400,7 +2400,7 @@
           <a:p>
             <a:fld id="{376CE277-F64F-CD4D-8092-A1FBD0226130}" type="datetimeFigureOut">
               <a:rPr lang="en-CH" smtClean="0"/>
-              <a:t>14.10.2024</a:t>
+              <a:t>10/23/24</a:t>
             </a:fld>
             <a:endParaRPr lang="en-CH"/>
           </a:p>
@@ -2689,7 +2689,7 @@
           <a:p>
             <a:fld id="{376CE277-F64F-CD4D-8092-A1FBD0226130}" type="datetimeFigureOut">
               <a:rPr lang="en-CH" smtClean="0"/>
-              <a:t>14.10.2024</a:t>
+              <a:t>10/23/24</a:t>
             </a:fld>
             <a:endParaRPr lang="en-CH"/>
           </a:p>
@@ -2932,7 +2932,7 @@
           <a:p>
             <a:fld id="{376CE277-F64F-CD4D-8092-A1FBD0226130}" type="datetimeFigureOut">
               <a:rPr lang="en-CH" smtClean="0"/>
-              <a:t>14.10.2024</a:t>
+              <a:t>10/23/24</a:t>
             </a:fld>
             <a:endParaRPr lang="en-CH"/>
           </a:p>
@@ -4413,9 +4413,6 @@
               <a:rPr lang="en-US" dirty="0"/>
               <a:t> things</a:t>
             </a:r>
-          </a:p>
-          <a:p>
-            <a:endParaRPr lang="en-US" dirty="0"/>
           </a:p>
         </p:txBody>
       </p:sp>

</xml_diff>